<commit_message>
week 5/6 update ppt
</commit_message>
<xml_diff>
--- a/Weekly Updates/Week5.pptx
+++ b/Weekly Updates/Week5.pptx
@@ -9,15 +9,16 @@
     <p:sldId id="263" r:id="rId3"/>
     <p:sldId id="262" r:id="rId4"/>
     <p:sldId id="267" r:id="rId5"/>
-    <p:sldId id="268" r:id="rId6"/>
-    <p:sldId id="269" r:id="rId7"/>
-    <p:sldId id="265" r:id="rId8"/>
-    <p:sldId id="260" r:id="rId9"/>
-    <p:sldId id="261" r:id="rId10"/>
-    <p:sldId id="264" r:id="rId11"/>
-    <p:sldId id="266" r:id="rId12"/>
-    <p:sldId id="270" r:id="rId13"/>
-    <p:sldId id="271" r:id="rId14"/>
+    <p:sldId id="269" r:id="rId6"/>
+    <p:sldId id="272" r:id="rId7"/>
+    <p:sldId id="273" r:id="rId8"/>
+    <p:sldId id="265" r:id="rId9"/>
+    <p:sldId id="260" r:id="rId10"/>
+    <p:sldId id="261" r:id="rId11"/>
+    <p:sldId id="264" r:id="rId12"/>
+    <p:sldId id="266" r:id="rId13"/>
+    <p:sldId id="270" r:id="rId14"/>
+    <p:sldId id="271" r:id="rId15"/>
   </p:sldIdLst>
   <p:sldSz cx="12192000" cy="6858000"/>
   <p:notesSz cx="6858000" cy="9144000"/>
@@ -271,7 +272,7 @@
           <a:p>
             <a:fld id="{8CFAD378-7451-4777-A831-E1432E1A94CB}" type="datetimeFigureOut">
               <a:rPr lang="en-US" smtClean="0"/>
-              <a:t>6/28/2018</a:t>
+              <a:t>7/6/2018</a:t>
             </a:fld>
             <a:endParaRPr lang="en-US"/>
           </a:p>
@@ -469,7 +470,7 @@
           <a:p>
             <a:fld id="{8CFAD378-7451-4777-A831-E1432E1A94CB}" type="datetimeFigureOut">
               <a:rPr lang="en-US" smtClean="0"/>
-              <a:t>6/28/2018</a:t>
+              <a:t>7/6/2018</a:t>
             </a:fld>
             <a:endParaRPr lang="en-US"/>
           </a:p>
@@ -677,7 +678,7 @@
           <a:p>
             <a:fld id="{8CFAD378-7451-4777-A831-E1432E1A94CB}" type="datetimeFigureOut">
               <a:rPr lang="en-US" smtClean="0"/>
-              <a:t>6/28/2018</a:t>
+              <a:t>7/6/2018</a:t>
             </a:fld>
             <a:endParaRPr lang="en-US"/>
           </a:p>
@@ -875,7 +876,7 @@
           <a:p>
             <a:fld id="{8CFAD378-7451-4777-A831-E1432E1A94CB}" type="datetimeFigureOut">
               <a:rPr lang="en-US" smtClean="0"/>
-              <a:t>6/28/2018</a:t>
+              <a:t>7/6/2018</a:t>
             </a:fld>
             <a:endParaRPr lang="en-US"/>
           </a:p>
@@ -1150,7 +1151,7 @@
           <a:p>
             <a:fld id="{8CFAD378-7451-4777-A831-E1432E1A94CB}" type="datetimeFigureOut">
               <a:rPr lang="en-US" smtClean="0"/>
-              <a:t>6/28/2018</a:t>
+              <a:t>7/6/2018</a:t>
             </a:fld>
             <a:endParaRPr lang="en-US"/>
           </a:p>
@@ -1415,7 +1416,7 @@
           <a:p>
             <a:fld id="{8CFAD378-7451-4777-A831-E1432E1A94CB}" type="datetimeFigureOut">
               <a:rPr lang="en-US" smtClean="0"/>
-              <a:t>6/28/2018</a:t>
+              <a:t>7/6/2018</a:t>
             </a:fld>
             <a:endParaRPr lang="en-US"/>
           </a:p>
@@ -1827,7 +1828,7 @@
           <a:p>
             <a:fld id="{8CFAD378-7451-4777-A831-E1432E1A94CB}" type="datetimeFigureOut">
               <a:rPr lang="en-US" smtClean="0"/>
-              <a:t>6/28/2018</a:t>
+              <a:t>7/6/2018</a:t>
             </a:fld>
             <a:endParaRPr lang="en-US"/>
           </a:p>
@@ -1968,7 +1969,7 @@
           <a:p>
             <a:fld id="{8CFAD378-7451-4777-A831-E1432E1A94CB}" type="datetimeFigureOut">
               <a:rPr lang="en-US" smtClean="0"/>
-              <a:t>6/28/2018</a:t>
+              <a:t>7/6/2018</a:t>
             </a:fld>
             <a:endParaRPr lang="en-US"/>
           </a:p>
@@ -2081,7 +2082,7 @@
           <a:p>
             <a:fld id="{8CFAD378-7451-4777-A831-E1432E1A94CB}" type="datetimeFigureOut">
               <a:rPr lang="en-US" smtClean="0"/>
-              <a:t>6/28/2018</a:t>
+              <a:t>7/6/2018</a:t>
             </a:fld>
             <a:endParaRPr lang="en-US"/>
           </a:p>
@@ -2392,7 +2393,7 @@
           <a:p>
             <a:fld id="{8CFAD378-7451-4777-A831-E1432E1A94CB}" type="datetimeFigureOut">
               <a:rPr lang="en-US" smtClean="0"/>
-              <a:t>6/28/2018</a:t>
+              <a:t>7/6/2018</a:t>
             </a:fld>
             <a:endParaRPr lang="en-US"/>
           </a:p>
@@ -2680,7 +2681,7 @@
           <a:p>
             <a:fld id="{8CFAD378-7451-4777-A831-E1432E1A94CB}" type="datetimeFigureOut">
               <a:rPr lang="en-US" smtClean="0"/>
-              <a:t>6/28/2018</a:t>
+              <a:t>7/6/2018</a:t>
             </a:fld>
             <a:endParaRPr lang="en-US"/>
           </a:p>
@@ -2921,7 +2922,7 @@
           <a:p>
             <a:fld id="{8CFAD378-7451-4777-A831-E1432E1A94CB}" type="datetimeFigureOut">
               <a:rPr lang="en-US" smtClean="0"/>
-              <a:t>6/28/2018</a:t>
+              <a:t>7/6/2018</a:t>
             </a:fld>
             <a:endParaRPr lang="en-US"/>
           </a:p>
@@ -3369,16 +3370,12 @@
               <a:rPr lang="en-US" dirty="0"/>
             </a:br>
             <a:r>
-              <a:rPr lang="en-US"/>
+              <a:rPr lang="en-US" dirty="0"/>
               <a:t>Week </a:t>
             </a:r>
             <a:r>
-              <a:rPr lang="en-US" dirty="0"/>
-              <a:t>5</a:t>
-            </a:r>
-            <a:r>
-              <a:rPr lang="en-US" smtClean="0"/>
-              <a:t> </a:t>
+              <a:rPr lang="en-US" dirty="0" smtClean="0"/>
+              <a:t>5/6 </a:t>
             </a:r>
             <a:r>
               <a:rPr lang="en-US" dirty="0"/>
@@ -3469,7 +3466,7 @@
           <p:cNvPr id="2" name="Title 1">
             <a:extLst>
               <a:ext uri="{FF2B5EF4-FFF2-40B4-BE49-F238E27FC236}">
-                <a16:creationId xmlns:a16="http://schemas.microsoft.com/office/drawing/2014/main" id="{5EF4F688-E0AF-4FB6-89E1-31ACE46128F1}"/>
+                <a16:creationId xmlns:a16="http://schemas.microsoft.com/office/drawing/2014/main" id="{FFD80D3C-0DE5-4787-AD89-FCA2B073CAA9}"/>
               </a:ext>
             </a:extLst>
           </p:cNvPr>
@@ -3497,7 +3494,7 @@
           <p:cNvPr id="3" name="Content Placeholder 2">
             <a:extLst>
               <a:ext uri="{FF2B5EF4-FFF2-40B4-BE49-F238E27FC236}">
-                <a16:creationId xmlns:a16="http://schemas.microsoft.com/office/drawing/2014/main" id="{B4C844F7-E960-4048-BB55-A40BA7FDB0FD}"/>
+                <a16:creationId xmlns:a16="http://schemas.microsoft.com/office/drawing/2014/main" id="{77C7C523-BD01-4F5C-ADCB-063CC6B09E70}"/>
               </a:ext>
             </a:extLst>
           </p:cNvPr>
@@ -3515,16 +3512,28 @@
           <a:p>
             <a:r>
               <a:rPr lang="en-US" dirty="0"/>
-              <a:t>Make sure SolidWorks Interop files (SolidWorks Native API) have the same version as those referenced by AngelSix API</a:t>
-            </a:r>
-          </a:p>
-          <a:p>
-            <a:endParaRPr lang="en-US" dirty="0"/>
-          </a:p>
-          <a:p>
+              <a:t>Packages downloaded from GitHub do not compile because Dna.Framework is not a valid namespace</a:t>
+            </a:r>
+          </a:p>
+          <a:p>
+            <a:pPr lvl="1"/>
             <a:r>
               <a:rPr lang="en-US" dirty="0"/>
-              <a:t>AngelSix API uses .NET Framework 4.7.1, so make sure this is consistent with your solution</a:t>
+              <a:t>Dna.Framework, also written by AngelSix, is a NuGet package</a:t>
+            </a:r>
+          </a:p>
+          <a:p>
+            <a:pPr lvl="1"/>
+            <a:r>
+              <a:rPr lang="en-US" dirty="0"/>
+              <a:t>NuGet is a free, open-source package manager in Visual Studio</a:t>
+            </a:r>
+          </a:p>
+          <a:p>
+            <a:pPr lvl="1"/>
+            <a:r>
+              <a:rPr lang="en-US" dirty="0"/>
+              <a:t>Make sure this package is properly installed (with dependencies) for each solution</a:t>
             </a:r>
           </a:p>
         </p:txBody>
@@ -3532,7 +3541,7 @@
     </p:spTree>
     <p:extLst>
       <p:ext uri="{BB962C8B-B14F-4D97-AF65-F5344CB8AC3E}">
-        <p14:creationId xmlns:p14="http://schemas.microsoft.com/office/powerpoint/2010/main" val="790591578"/>
+        <p14:creationId xmlns:p14="http://schemas.microsoft.com/office/powerpoint/2010/main" val="1105893448"/>
       </p:ext>
     </p:extLst>
   </p:cSld>
@@ -3561,7 +3570,13 @@
       </p:grpSpPr>
       <p:sp>
         <p:nvSpPr>
-          <p:cNvPr id="2" name="Title 1"/>
+          <p:cNvPr id="2" name="Title 1">
+            <a:extLst>
+              <a:ext uri="{FF2B5EF4-FFF2-40B4-BE49-F238E27FC236}">
+                <a16:creationId xmlns:a16="http://schemas.microsoft.com/office/drawing/2014/main" id="{5EF4F688-E0AF-4FB6-89E1-31ACE46128F1}"/>
+              </a:ext>
+            </a:extLst>
+          </p:cNvPr>
           <p:cNvSpPr>
             <a:spLocks noGrp="1"/>
           </p:cNvSpPr>
@@ -3583,7 +3598,13 @@
       </p:sp>
       <p:sp>
         <p:nvSpPr>
-          <p:cNvPr id="3" name="Content Placeholder 2"/>
+          <p:cNvPr id="3" name="Content Placeholder 2">
+            <a:extLst>
+              <a:ext uri="{FF2B5EF4-FFF2-40B4-BE49-F238E27FC236}">
+                <a16:creationId xmlns:a16="http://schemas.microsoft.com/office/drawing/2014/main" id="{B4C844F7-E960-4048-BB55-A40BA7FDB0FD}"/>
+              </a:ext>
+            </a:extLst>
+          </p:cNvPr>
           <p:cNvSpPr>
             <a:spLocks noGrp="1"/>
           </p:cNvSpPr>
@@ -3598,7 +3619,7 @@
           <a:p>
             <a:r>
               <a:rPr lang="en-US" dirty="0"/>
-              <a:t>Installing add-in shows too many Command Manager Items</a:t>
+              <a:t>Make sure SolidWorks Interop files (SolidWorks Native API) have the same version as those referenced by AngelSix API</a:t>
             </a:r>
           </a:p>
           <a:p>
@@ -3607,33 +3628,7 @@
           <a:p>
             <a:r>
               <a:rPr lang="en-US" dirty="0"/>
-              <a:t>Renaming the project when you have a Command Manager Item plug-in causes this</a:t>
-            </a:r>
-          </a:p>
-          <a:p>
-            <a:endParaRPr lang="en-US" dirty="0"/>
-          </a:p>
-          <a:p>
-            <a:r>
-              <a:rPr lang="en-US" dirty="0"/>
-              <a:t>Have not found the fix so far</a:t>
-            </a:r>
-          </a:p>
-          <a:p>
-            <a:endParaRPr lang="en-US" dirty="0"/>
-          </a:p>
-          <a:p>
-            <a:r>
-              <a:rPr lang="en-US" dirty="0"/>
-              <a:t>Possible walk-around: clone the project, and export a new .</a:t>
-            </a:r>
-            <a:r>
-              <a:rPr lang="en-US" dirty="0" err="1"/>
-              <a:t>dll</a:t>
-            </a:r>
-            <a:r>
-              <a:rPr lang="en-US" dirty="0"/>
-              <a:t> </a:t>
+              <a:t>AngelSix API uses .NET Framework 4.7.1, so make sure this is consistent with your solution</a:t>
             </a:r>
           </a:p>
         </p:txBody>
@@ -3641,7 +3636,7 @@
     </p:spTree>
     <p:extLst>
       <p:ext uri="{BB962C8B-B14F-4D97-AF65-F5344CB8AC3E}">
-        <p14:creationId xmlns:p14="http://schemas.microsoft.com/office/powerpoint/2010/main" val="2651655616"/>
+        <p14:creationId xmlns:p14="http://schemas.microsoft.com/office/powerpoint/2010/main" val="790591578"/>
       </p:ext>
     </p:extLst>
   </p:cSld>
@@ -3706,6 +3701,115 @@
           <a:lstStyle/>
           <a:p>
             <a:r>
+              <a:rPr lang="en-US" dirty="0"/>
+              <a:t>Installing add-in shows too many Command Manager Items</a:t>
+            </a:r>
+          </a:p>
+          <a:p>
+            <a:endParaRPr lang="en-US" dirty="0"/>
+          </a:p>
+          <a:p>
+            <a:r>
+              <a:rPr lang="en-US" dirty="0"/>
+              <a:t>Renaming the project when you have a Command Manager Item plug-in causes this</a:t>
+            </a:r>
+          </a:p>
+          <a:p>
+            <a:endParaRPr lang="en-US" dirty="0"/>
+          </a:p>
+          <a:p>
+            <a:r>
+              <a:rPr lang="en-US" dirty="0"/>
+              <a:t>Have not found the fix so far</a:t>
+            </a:r>
+          </a:p>
+          <a:p>
+            <a:endParaRPr lang="en-US" dirty="0"/>
+          </a:p>
+          <a:p>
+            <a:r>
+              <a:rPr lang="en-US" dirty="0"/>
+              <a:t>Possible walk-around: clone the project, and export a new .</a:t>
+            </a:r>
+            <a:r>
+              <a:rPr lang="en-US" dirty="0" err="1"/>
+              <a:t>dll</a:t>
+            </a:r>
+            <a:r>
+              <a:rPr lang="en-US" dirty="0"/>
+              <a:t> </a:t>
+            </a:r>
+          </a:p>
+        </p:txBody>
+      </p:sp>
+    </p:spTree>
+    <p:extLst>
+      <p:ext uri="{BB962C8B-B14F-4D97-AF65-F5344CB8AC3E}">
+        <p14:creationId xmlns:p14="http://schemas.microsoft.com/office/powerpoint/2010/main" val="2651655616"/>
+      </p:ext>
+    </p:extLst>
+  </p:cSld>
+  <p:clrMapOvr>
+    <a:masterClrMapping/>
+  </p:clrMapOvr>
+</p:sld>
+</file>
+
+<file path=ppt/slides/slide13.xml><?xml version="1.0" encoding="utf-8"?>
+<p:sld xmlns:a="http://schemas.openxmlformats.org/drawingml/2006/main" xmlns:r="http://schemas.openxmlformats.org/officeDocument/2006/relationships" xmlns:p="http://schemas.openxmlformats.org/presentationml/2006/main">
+  <p:cSld>
+    <p:spTree>
+      <p:nvGrpSpPr>
+        <p:cNvPr id="1" name=""/>
+        <p:cNvGrpSpPr/>
+        <p:nvPr/>
+      </p:nvGrpSpPr>
+      <p:grpSpPr>
+        <a:xfrm>
+          <a:off x="0" y="0"/>
+          <a:ext cx="0" cy="0"/>
+          <a:chOff x="0" y="0"/>
+          <a:chExt cx="0" cy="0"/>
+        </a:xfrm>
+      </p:grpSpPr>
+      <p:sp>
+        <p:nvSpPr>
+          <p:cNvPr id="2" name="Title 1"/>
+          <p:cNvSpPr>
+            <a:spLocks noGrp="1"/>
+          </p:cNvSpPr>
+          <p:nvPr>
+            <p:ph type="title"/>
+          </p:nvPr>
+        </p:nvSpPr>
+        <p:spPr/>
+        <p:txBody>
+          <a:bodyPr/>
+          <a:lstStyle/>
+          <a:p>
+            <a:r>
+              <a:rPr lang="en-US" dirty="0"/>
+              <a:t>Problems List and Solution (Cont’d)</a:t>
+            </a:r>
+          </a:p>
+        </p:txBody>
+      </p:sp>
+      <p:sp>
+        <p:nvSpPr>
+          <p:cNvPr id="3" name="Content Placeholder 2"/>
+          <p:cNvSpPr>
+            <a:spLocks noGrp="1"/>
+          </p:cNvSpPr>
+          <p:nvPr>
+            <p:ph idx="1"/>
+          </p:nvPr>
+        </p:nvSpPr>
+        <p:spPr/>
+        <p:txBody>
+          <a:bodyPr/>
+          <a:lstStyle/>
+          <a:p>
+            <a:r>
               <a:rPr lang="en-US" dirty="0" err="1" smtClean="0"/>
               <a:t>SculptPrint</a:t>
             </a:r>
@@ -3781,7 +3885,7 @@
 </p:sld>
 </file>
 
-<file path=ppt/slides/slide13.xml><?xml version="1.0" encoding="utf-8"?>
+<file path=ppt/slides/slide14.xml><?xml version="1.0" encoding="utf-8"?>
 <p:sld xmlns:a="http://schemas.openxmlformats.org/drawingml/2006/main" xmlns:r="http://schemas.openxmlformats.org/officeDocument/2006/relationships" xmlns:p="http://schemas.openxmlformats.org/presentationml/2006/main">
   <p:cSld>
     <p:spTree>
@@ -3927,7 +4031,7 @@
             </a:r>
             <a:r>
               <a:rPr lang="en-US" dirty="0" smtClean="0"/>
-              <a:t>4</a:t>
+              <a:t>5/6</a:t>
             </a:r>
             <a:endParaRPr lang="en-US" dirty="0"/>
           </a:p>
@@ -3952,7 +4056,7 @@
         <p:spPr/>
         <p:txBody>
           <a:bodyPr>
-            <a:normAutofit/>
+            <a:normAutofit fontScale="92500" lnSpcReduction="20000"/>
           </a:bodyPr>
           <a:lstStyle/>
           <a:p>
@@ -3962,15 +4066,21 @@
             </a:pPr>
             <a:r>
               <a:rPr lang="en-US" dirty="0" smtClean="0"/>
-              <a:t>Added UI for user to input design tolerances for features</a:t>
-            </a:r>
+              <a:t>Plug-in changes default export setting in </a:t>
+            </a:r>
+            <a:r>
+              <a:rPr lang="en-US" dirty="0" err="1" smtClean="0"/>
+              <a:t>Solidworks</a:t>
+            </a:r>
+            <a:endParaRPr lang="en-US" dirty="0" smtClean="0"/>
           </a:p>
           <a:p>
             <a:pPr lvl="1"/>
             <a:r>
-              <a:rPr lang="en-US" dirty="0"/>
-              <a:t>Need to add support for user to add additional tolerances</a:t>
-            </a:r>
+              <a:rPr lang="en-US" dirty="0" smtClean="0"/>
+              <a:t>Part is exported with user-specified coordinate axes</a:t>
+            </a:r>
+            <a:endParaRPr lang="en-US" dirty="0"/>
           </a:p>
           <a:p>
             <a:pPr lvl="1"/>
@@ -3983,7 +4093,7 @@
             </a:pPr>
             <a:r>
               <a:rPr lang="en-US" dirty="0" smtClean="0"/>
-              <a:t>Improved sidebar UI (new design and new sections)</a:t>
+              <a:t>Limit raw material list to simple materials</a:t>
             </a:r>
             <a:endParaRPr lang="en-US" dirty="0"/>
           </a:p>
@@ -3998,30 +4108,58 @@
             </a:pPr>
             <a:r>
               <a:rPr lang="en-US" dirty="0" smtClean="0"/>
-              <a:t>Started interfacing with </a:t>
+              <a:t>Added info buttons so users can learn the function of each section of plug-in</a:t>
+            </a:r>
+          </a:p>
+          <a:p>
+            <a:pPr marL="514350" indent="-514350">
+              <a:buFont typeface="+mj-lt"/>
+              <a:buAutoNum type="arabicPeriod"/>
+            </a:pPr>
+            <a:endParaRPr lang="en-US" dirty="0"/>
+          </a:p>
+          <a:p>
+            <a:pPr marL="514350" indent="-514350">
+              <a:buFont typeface="+mj-lt"/>
+              <a:buAutoNum type="arabicPeriod"/>
+            </a:pPr>
+            <a:r>
+              <a:rPr lang="en-US" dirty="0" smtClean="0"/>
+              <a:t>Save all tolerances and notes as custom properties in </a:t>
+            </a:r>
+            <a:r>
+              <a:rPr lang="en-US" dirty="0" err="1" smtClean="0"/>
+              <a:t>Solidworks</a:t>
+            </a:r>
+            <a:endParaRPr lang="en-US" dirty="0" smtClean="0"/>
+          </a:p>
+          <a:p>
+            <a:pPr lvl="1"/>
+            <a:r>
+              <a:rPr lang="en-US" dirty="0" smtClean="0"/>
+              <a:t>Machinist can open part and read back user-specified values</a:t>
+            </a:r>
+          </a:p>
+          <a:p>
+            <a:pPr lvl="1"/>
+            <a:endParaRPr lang="en-US" dirty="0"/>
+          </a:p>
+          <a:p>
+            <a:pPr marL="457200" indent="-457200">
+              <a:buFont typeface="+mj-lt"/>
+              <a:buAutoNum type="arabicPeriod"/>
+            </a:pPr>
+            <a:r>
+              <a:rPr lang="en-US" dirty="0" smtClean="0"/>
+              <a:t>Continued examining </a:t>
             </a:r>
             <a:r>
               <a:rPr lang="en-US" dirty="0" err="1" smtClean="0"/>
               <a:t>SculptPrint</a:t>
             </a:r>
-            <a:endParaRPr lang="en-US" dirty="0" smtClean="0"/>
-          </a:p>
-          <a:p>
-            <a:pPr lvl="1"/>
-            <a:r>
-              <a:rPr lang="en-US" dirty="0"/>
-              <a:t>Can run automated Python script from C</a:t>
-            </a:r>
             <a:r>
               <a:rPr lang="en-US" dirty="0" smtClean="0"/>
-              <a:t>#</a:t>
-            </a:r>
-          </a:p>
-          <a:p>
-            <a:pPr lvl="1"/>
-            <a:r>
-              <a:rPr lang="en-US" dirty="0" smtClean="0"/>
-              <a:t>Need to test automated script to fixture part and calculate tool paths</a:t>
+              <a:t> feedback pathway </a:t>
             </a:r>
             <a:endParaRPr lang="en-US" dirty="0"/>
           </a:p>
@@ -4114,15 +4252,15 @@
             </a:pPr>
             <a:r>
               <a:rPr lang="en-US" dirty="0" smtClean="0"/>
-              <a:t>Complete and test interface </a:t>
-            </a:r>
-            <a:r>
-              <a:rPr lang="en-US" dirty="0"/>
-              <a:t>with </a:t>
-            </a:r>
-            <a:r>
-              <a:rPr lang="en-US" dirty="0" err="1"/>
+              <a:t>Continue work on </a:t>
+            </a:r>
+            <a:r>
+              <a:rPr lang="en-US" dirty="0" err="1" smtClean="0"/>
               <a:t>SculptPrint</a:t>
+            </a:r>
+            <a:r>
+              <a:rPr lang="en-US" dirty="0" smtClean="0"/>
+              <a:t> interface (need direction)</a:t>
             </a:r>
             <a:endParaRPr lang="en-US" dirty="0"/>
           </a:p>
@@ -4230,22 +4368,28 @@
       </p:grpSpPr>
       <p:pic>
         <p:nvPicPr>
-          <p:cNvPr id="3" name="Picture 2"/>
+          <p:cNvPr id="2" name="Picture 1"/>
           <p:cNvPicPr>
             <a:picLocks noChangeAspect="1"/>
           </p:cNvPicPr>
           <p:nvPr/>
         </p:nvPicPr>
         <p:blipFill>
-          <a:blip r:embed="rId2"/>
+          <a:blip r:embed="rId2">
+            <a:extLst>
+              <a:ext uri="{28A0092B-C50C-407E-A947-70E740481C1C}">
+                <a14:useLocalDpi xmlns:a14="http://schemas.microsoft.com/office/drawing/2010/main" val="0"/>
+              </a:ext>
+            </a:extLst>
+          </a:blip>
           <a:stretch>
             <a:fillRect/>
           </a:stretch>
         </p:blipFill>
         <p:spPr>
           <a:xfrm>
-            <a:off x="1108556" y="228600"/>
-            <a:ext cx="9974888" cy="6400800"/>
+            <a:off x="752310" y="0"/>
+            <a:ext cx="10687380" cy="6858000"/>
           </a:xfrm>
           <a:prstGeom prst="rect">
             <a:avLst/>
@@ -4291,15 +4435,21 @@
           <p:nvPr/>
         </p:nvPicPr>
         <p:blipFill>
-          <a:blip r:embed="rId2"/>
+          <a:blip r:embed="rId2">
+            <a:extLst>
+              <a:ext uri="{28A0092B-C50C-407E-A947-70E740481C1C}">
+                <a14:useLocalDpi xmlns:a14="http://schemas.microsoft.com/office/drawing/2010/main" val="0"/>
+              </a:ext>
+            </a:extLst>
+          </a:blip>
           <a:stretch>
             <a:fillRect/>
           </a:stretch>
         </p:blipFill>
         <p:spPr>
           <a:xfrm>
-            <a:off x="1124541" y="228600"/>
-            <a:ext cx="9942919" cy="6400800"/>
+            <a:off x="999757" y="0"/>
+            <a:ext cx="10192486" cy="6858000"/>
           </a:xfrm>
           <a:prstGeom prst="rect">
             <a:avLst/>
@@ -4309,7 +4459,7 @@
     </p:spTree>
     <p:extLst>
       <p:ext uri="{BB962C8B-B14F-4D97-AF65-F5344CB8AC3E}">
-        <p14:creationId xmlns:p14="http://schemas.microsoft.com/office/powerpoint/2010/main" val="3742137522"/>
+        <p14:creationId xmlns:p14="http://schemas.microsoft.com/office/powerpoint/2010/main" val="993965546"/>
       </p:ext>
     </p:extLst>
   </p:cSld>
@@ -4338,22 +4488,28 @@
       </p:grpSpPr>
       <p:pic>
         <p:nvPicPr>
-          <p:cNvPr id="2" name="Picture 1"/>
+          <p:cNvPr id="4" name="Picture 3"/>
           <p:cNvPicPr>
             <a:picLocks noChangeAspect="1"/>
           </p:cNvPicPr>
           <p:nvPr/>
         </p:nvPicPr>
         <p:blipFill>
-          <a:blip r:embed="rId2"/>
+          <a:blip r:embed="rId2">
+            <a:extLst>
+              <a:ext uri="{28A0092B-C50C-407E-A947-70E740481C1C}">
+                <a14:useLocalDpi xmlns:a14="http://schemas.microsoft.com/office/drawing/2010/main" val="0"/>
+              </a:ext>
+            </a:extLst>
+          </a:blip>
           <a:stretch>
             <a:fillRect/>
           </a:stretch>
         </p:blipFill>
         <p:spPr>
           <a:xfrm>
-            <a:off x="1108556" y="228600"/>
-            <a:ext cx="9974888" cy="6400800"/>
+            <a:off x="2021305" y="1029659"/>
+            <a:ext cx="7823449" cy="4988866"/>
           </a:xfrm>
           <a:prstGeom prst="rect">
             <a:avLst/>
@@ -4363,7 +4519,7 @@
     </p:spTree>
     <p:extLst>
       <p:ext uri="{BB962C8B-B14F-4D97-AF65-F5344CB8AC3E}">
-        <p14:creationId xmlns:p14="http://schemas.microsoft.com/office/powerpoint/2010/main" val="993965546"/>
+        <p14:creationId xmlns:p14="http://schemas.microsoft.com/office/powerpoint/2010/main" val="1120476997"/>
       </p:ext>
     </p:extLst>
   </p:cSld>
@@ -4390,90 +4546,10 @@
           <a:chExt cx="0" cy="0"/>
         </a:xfrm>
       </p:grpSpPr>
-      <p:sp>
-        <p:nvSpPr>
-          <p:cNvPr id="2" name="Title 1">
-            <a:extLst>
-              <a:ext uri="{FF2B5EF4-FFF2-40B4-BE49-F238E27FC236}">
-                <a16:creationId xmlns:a16="http://schemas.microsoft.com/office/drawing/2014/main" id="{74D03DE4-8F63-4CF3-B2F1-D8930A138178}"/>
-              </a:ext>
-            </a:extLst>
-          </p:cNvPr>
-          <p:cNvSpPr>
-            <a:spLocks noGrp="1"/>
-          </p:cNvSpPr>
-          <p:nvPr>
-            <p:ph type="title"/>
-          </p:nvPr>
-        </p:nvSpPr>
-        <p:spPr/>
-        <p:txBody>
-          <a:bodyPr/>
-          <a:lstStyle/>
-          <a:p>
-            <a:r>
-              <a:rPr lang="en-US" dirty="0" smtClean="0"/>
-              <a:t>Project </a:t>
-            </a:r>
-            <a:r>
-              <a:rPr lang="en-US" dirty="0"/>
-              <a:t>Decisions</a:t>
-            </a:r>
-          </a:p>
-        </p:txBody>
-      </p:sp>
-      <p:sp>
-        <p:nvSpPr>
-          <p:cNvPr id="3" name="Content Placeholder 2">
-            <a:extLst>
-              <a:ext uri="{FF2B5EF4-FFF2-40B4-BE49-F238E27FC236}">
-                <a16:creationId xmlns:a16="http://schemas.microsoft.com/office/drawing/2014/main" id="{A96EC9EA-A5D4-4E2C-BC85-CEDE3BC1F5E6}"/>
-              </a:ext>
-            </a:extLst>
-          </p:cNvPr>
-          <p:cNvSpPr>
-            <a:spLocks noGrp="1"/>
-          </p:cNvSpPr>
-          <p:nvPr>
-            <p:ph idx="1"/>
-          </p:nvPr>
-        </p:nvSpPr>
-        <p:spPr/>
-        <p:txBody>
-          <a:bodyPr/>
-          <a:lstStyle/>
-          <a:p>
-            <a:r>
-              <a:rPr lang="en-US" dirty="0"/>
-              <a:t>Need a proper name and description to display in </a:t>
-            </a:r>
-            <a:r>
-              <a:rPr lang="en-US" dirty="0" smtClean="0"/>
-              <a:t>SolidWorks</a:t>
-            </a:r>
-          </a:p>
-          <a:p>
-            <a:endParaRPr lang="en-US" dirty="0"/>
-          </a:p>
-          <a:p>
-            <a:r>
-              <a:rPr lang="en-US" dirty="0" smtClean="0"/>
-              <a:t>Need to determine ideal instructions for message-box prompts</a:t>
-            </a:r>
-            <a:endParaRPr lang="en-US" dirty="0"/>
-          </a:p>
-          <a:p>
-            <a:endParaRPr lang="en-US" dirty="0"/>
-          </a:p>
-          <a:p>
-            <a:endParaRPr lang="en-US" dirty="0"/>
-          </a:p>
-        </p:txBody>
-      </p:sp>
     </p:spTree>
     <p:extLst>
       <p:ext uri="{BB962C8B-B14F-4D97-AF65-F5344CB8AC3E}">
-        <p14:creationId xmlns:p14="http://schemas.microsoft.com/office/powerpoint/2010/main" val="1983117304"/>
+        <p14:creationId xmlns:p14="http://schemas.microsoft.com/office/powerpoint/2010/main" val="1882753280"/>
       </p:ext>
     </p:extLst>
   </p:cSld>
@@ -4505,7 +4581,7 @@
           <p:cNvPr id="2" name="Title 1">
             <a:extLst>
               <a:ext uri="{FF2B5EF4-FFF2-40B4-BE49-F238E27FC236}">
-                <a16:creationId xmlns:a16="http://schemas.microsoft.com/office/drawing/2014/main" id="{9326EEC7-422E-4A70-8740-43F28C77C875}"/>
+                <a16:creationId xmlns:a16="http://schemas.microsoft.com/office/drawing/2014/main" id="{74D03DE4-8F63-4CF3-B2F1-D8930A138178}"/>
               </a:ext>
             </a:extLst>
           </p:cNvPr>
@@ -4522,8 +4598,12 @@
           <a:lstStyle/>
           <a:p>
             <a:r>
+              <a:rPr lang="en-US" dirty="0" smtClean="0"/>
+              <a:t>Project </a:t>
+            </a:r>
+            <a:r>
               <a:rPr lang="en-US" dirty="0"/>
-              <a:t>Problems List and Solution</a:t>
+              <a:t>Decisions</a:t>
             </a:r>
           </a:p>
         </p:txBody>
@@ -4533,7 +4613,7 @@
           <p:cNvPr id="3" name="Content Placeholder 2">
             <a:extLst>
               <a:ext uri="{FF2B5EF4-FFF2-40B4-BE49-F238E27FC236}">
-                <a16:creationId xmlns:a16="http://schemas.microsoft.com/office/drawing/2014/main" id="{93D28F83-2A80-45E7-A6A6-C520B1FAEE69}"/>
+                <a16:creationId xmlns:a16="http://schemas.microsoft.com/office/drawing/2014/main" id="{A96EC9EA-A5D4-4E2C-BC85-CEDE3BC1F5E6}"/>
               </a:ext>
             </a:extLst>
           </p:cNvPr>
@@ -4551,48 +4631,48 @@
           <a:p>
             <a:r>
               <a:rPr lang="en-US" dirty="0"/>
-              <a:t>AngelSix Add-In Installer returns with an error</a:t>
-            </a:r>
-          </a:p>
-          <a:p>
-            <a:pPr lvl="1"/>
-            <a:r>
-              <a:rPr lang="en-US" dirty="0"/>
-              <a:t>The add-in installer runs RegAsm.exe to register your plug-in’s .</a:t>
-            </a:r>
-            <a:r>
-              <a:rPr lang="en-US" dirty="0" err="1"/>
-              <a:t>dll</a:t>
-            </a:r>
+              <a:t>Need a proper name and description to display in </a:t>
+            </a:r>
+            <a:r>
+              <a:rPr lang="en-US" dirty="0" smtClean="0"/>
+              <a:t>SolidWorks</a:t>
+            </a:r>
+          </a:p>
+          <a:p>
             <a:endParaRPr lang="en-US" dirty="0"/>
           </a:p>
           <a:p>
-            <a:pPr lvl="1"/>
-            <a:r>
-              <a:rPr lang="en-US" dirty="0"/>
-              <a:t>Can debug manually</a:t>
-            </a:r>
-          </a:p>
-          <a:p>
-            <a:pPr lvl="1"/>
-            <a:r>
-              <a:rPr lang="en-US" dirty="0"/>
-              <a:t>cd C:\Windows\Microsoft.NET\Framework64\v4.0.30319</a:t>
-            </a:r>
-          </a:p>
-          <a:p>
-            <a:pPr lvl="1"/>
-            <a:r>
-              <a:rPr lang="en-US" dirty="0"/>
-              <a:t>RegAsm.exe /codebase "C:\Users\Aniruddh\Desktop\solidworks-api-develop\Tutorials\DynamicReload\DynamicReload\bin\Debug\DynamicReload.dll"</a:t>
-            </a:r>
+            <a:r>
+              <a:rPr lang="en-US" dirty="0" smtClean="0"/>
+              <a:t>Need to determine ideal instructions for message-box </a:t>
+            </a:r>
+            <a:r>
+              <a:rPr lang="en-US" dirty="0" smtClean="0"/>
+              <a:t>prompts</a:t>
+            </a:r>
+          </a:p>
+          <a:p>
+            <a:endParaRPr lang="en-US" dirty="0"/>
+          </a:p>
+          <a:p>
+            <a:r>
+              <a:rPr lang="en-US" dirty="0" smtClean="0"/>
+              <a:t>Need to choose message prompts when user hovers over info buttons</a:t>
+            </a:r>
+            <a:endParaRPr lang="en-US" dirty="0"/>
+          </a:p>
+          <a:p>
+            <a:endParaRPr lang="en-US" dirty="0"/>
+          </a:p>
+          <a:p>
+            <a:endParaRPr lang="en-US" dirty="0"/>
           </a:p>
         </p:txBody>
       </p:sp>
     </p:spTree>
     <p:extLst>
       <p:ext uri="{BB962C8B-B14F-4D97-AF65-F5344CB8AC3E}">
-        <p14:creationId xmlns:p14="http://schemas.microsoft.com/office/powerpoint/2010/main" val="1357193124"/>
+        <p14:creationId xmlns:p14="http://schemas.microsoft.com/office/powerpoint/2010/main" val="1983117304"/>
       </p:ext>
     </p:extLst>
   </p:cSld>
@@ -4624,7 +4704,7 @@
           <p:cNvPr id="2" name="Title 1">
             <a:extLst>
               <a:ext uri="{FF2B5EF4-FFF2-40B4-BE49-F238E27FC236}">
-                <a16:creationId xmlns:a16="http://schemas.microsoft.com/office/drawing/2014/main" id="{FFD80D3C-0DE5-4787-AD89-FCA2B073CAA9}"/>
+                <a16:creationId xmlns:a16="http://schemas.microsoft.com/office/drawing/2014/main" id="{9326EEC7-422E-4A70-8740-43F28C77C875}"/>
               </a:ext>
             </a:extLst>
           </p:cNvPr>
@@ -4642,7 +4722,7 @@
           <a:p>
             <a:r>
               <a:rPr lang="en-US" dirty="0"/>
-              <a:t>Problems List and Solution (Cont’d)</a:t>
+              <a:t>Problems List and Solution</a:t>
             </a:r>
           </a:p>
         </p:txBody>
@@ -4652,7 +4732,7 @@
           <p:cNvPr id="3" name="Content Placeholder 2">
             <a:extLst>
               <a:ext uri="{FF2B5EF4-FFF2-40B4-BE49-F238E27FC236}">
-                <a16:creationId xmlns:a16="http://schemas.microsoft.com/office/drawing/2014/main" id="{77C7C523-BD01-4F5C-ADCB-063CC6B09E70}"/>
+                <a16:creationId xmlns:a16="http://schemas.microsoft.com/office/drawing/2014/main" id="{93D28F83-2A80-45E7-A6A6-C520B1FAEE69}"/>
               </a:ext>
             </a:extLst>
           </p:cNvPr>
@@ -4670,28 +4750,40 @@
           <a:p>
             <a:r>
               <a:rPr lang="en-US" dirty="0"/>
-              <a:t>Packages downloaded from GitHub do not compile because Dna.Framework is not a valid namespace</a:t>
+              <a:t>AngelSix Add-In Installer returns with an error</a:t>
             </a:r>
           </a:p>
           <a:p>
             <a:pPr lvl="1"/>
             <a:r>
               <a:rPr lang="en-US" dirty="0"/>
-              <a:t>Dna.Framework, also written by AngelSix, is a NuGet package</a:t>
-            </a:r>
+              <a:t>The add-in installer runs RegAsm.exe to register your plug-in’s .</a:t>
+            </a:r>
+            <a:r>
+              <a:rPr lang="en-US" dirty="0" err="1"/>
+              <a:t>dll</a:t>
+            </a:r>
+            <a:endParaRPr lang="en-US" dirty="0"/>
           </a:p>
           <a:p>
             <a:pPr lvl="1"/>
             <a:r>
               <a:rPr lang="en-US" dirty="0"/>
-              <a:t>NuGet is a free, open-source package manager in Visual Studio</a:t>
+              <a:t>Can debug manually</a:t>
             </a:r>
           </a:p>
           <a:p>
             <a:pPr lvl="1"/>
             <a:r>
               <a:rPr lang="en-US" dirty="0"/>
-              <a:t>Make sure this package is properly installed (with dependencies) for each solution</a:t>
+              <a:t>cd C:\Windows\Microsoft.NET\Framework64\v4.0.30319</a:t>
+            </a:r>
+          </a:p>
+          <a:p>
+            <a:pPr lvl="1"/>
+            <a:r>
+              <a:rPr lang="en-US" dirty="0"/>
+              <a:t>RegAsm.exe /codebase "C:\Users\Aniruddh\Desktop\solidworks-api-develop\Tutorials\DynamicReload\DynamicReload\bin\Debug\DynamicReload.dll"</a:t>
             </a:r>
           </a:p>
         </p:txBody>
@@ -4699,7 +4791,7 @@
     </p:spTree>
     <p:extLst>
       <p:ext uri="{BB962C8B-B14F-4D97-AF65-F5344CB8AC3E}">
-        <p14:creationId xmlns:p14="http://schemas.microsoft.com/office/powerpoint/2010/main" val="1105893448"/>
+        <p14:creationId xmlns:p14="http://schemas.microsoft.com/office/powerpoint/2010/main" val="1357193124"/>
       </p:ext>
     </p:extLst>
   </p:cSld>

</xml_diff>